<commit_message>
added slide on standards
</commit_message>
<xml_diff>
--- a/ref/comphy_wrapup.pptx
+++ b/ref/comphy_wrapup.pptx
@@ -8,13 +8,14 @@
     <p:sldId id="256" r:id="rId2"/>
     <p:sldId id="262" r:id="rId3"/>
     <p:sldId id="263" r:id="rId4"/>
-    <p:sldId id="264" r:id="rId5"/>
-    <p:sldId id="265" r:id="rId6"/>
-    <p:sldId id="266" r:id="rId7"/>
-    <p:sldId id="267" r:id="rId8"/>
-    <p:sldId id="268" r:id="rId9"/>
-    <p:sldId id="269" r:id="rId10"/>
-    <p:sldId id="270" r:id="rId11"/>
+    <p:sldId id="265" r:id="rId5"/>
+    <p:sldId id="271" r:id="rId6"/>
+    <p:sldId id="264" r:id="rId7"/>
+    <p:sldId id="266" r:id="rId8"/>
+    <p:sldId id="267" r:id="rId9"/>
+    <p:sldId id="268" r:id="rId10"/>
+    <p:sldId id="269" r:id="rId11"/>
+    <p:sldId id="270" r:id="rId12"/>
   </p:sldIdLst>
   <p:sldSz cx="9144000" cy="6858000" type="screen4x3"/>
   <p:notesSz cx="6858000" cy="9144000"/>
@@ -3800,6 +3801,122 @@
           <a:chExt cx="0" cy="0"/>
         </a:xfrm>
       </p:grpSpPr>
+      <p:sp>
+        <p:nvSpPr>
+          <p:cNvPr id="2" name="Title 1"/>
+          <p:cNvSpPr>
+            <a:spLocks noGrp="1"/>
+          </p:cNvSpPr>
+          <p:nvPr>
+            <p:ph type="title"/>
+          </p:nvPr>
+        </p:nvSpPr>
+        <p:spPr/>
+        <p:txBody>
+          <a:bodyPr/>
+          <a:lstStyle/>
+          <a:p>
+            <a:r>
+              <a:rPr lang="en-US" dirty="0" smtClean="0"/>
+              <a:t>Get involved!</a:t>
+            </a:r>
+            <a:endParaRPr lang="en-US" dirty="0"/>
+          </a:p>
+        </p:txBody>
+      </p:sp>
+      <p:sp>
+        <p:nvSpPr>
+          <p:cNvPr id="3" name="Content Placeholder 2"/>
+          <p:cNvSpPr>
+            <a:spLocks noGrp="1"/>
+          </p:cNvSpPr>
+          <p:nvPr>
+            <p:ph sz="quarter" idx="1"/>
+          </p:nvPr>
+        </p:nvSpPr>
+        <p:spPr/>
+        <p:txBody>
+          <a:bodyPr/>
+          <a:lstStyle/>
+          <a:p>
+            <a:r>
+              <a:rPr lang="en-US" dirty="0" smtClean="0"/>
+              <a:t>Participate in the phyloinformatics community:</a:t>
+            </a:r>
+          </a:p>
+          <a:p>
+            <a:pPr lvl="1"/>
+            <a:r>
+              <a:rPr lang="en-US" dirty="0" smtClean="0"/>
+              <a:t>Share data </a:t>
+            </a:r>
+          </a:p>
+          <a:p>
+            <a:pPr lvl="1"/>
+            <a:r>
+              <a:rPr lang="en-US" dirty="0" smtClean="0"/>
+              <a:t>Share open source code</a:t>
+            </a:r>
+          </a:p>
+          <a:p>
+            <a:pPr lvl="1"/>
+            <a:r>
+              <a:rPr lang="en-US" dirty="0" smtClean="0"/>
+              <a:t>Collaborate</a:t>
+            </a:r>
+            <a:endParaRPr lang="en-US" dirty="0"/>
+          </a:p>
+        </p:txBody>
+      </p:sp>
+      <p:pic>
+        <p:nvPicPr>
+          <p:cNvPr id="4" name="Picture 3" descr="gsoc.jpg"/>
+          <p:cNvPicPr>
+            <a:picLocks noChangeAspect="1"/>
+          </p:cNvPicPr>
+          <p:nvPr/>
+        </p:nvPicPr>
+        <p:blipFill>
+          <a:blip r:embed="rId2"/>
+          <a:stretch>
+            <a:fillRect/>
+          </a:stretch>
+        </p:blipFill>
+        <p:spPr>
+          <a:xfrm>
+            <a:off x="4876800" y="2590800"/>
+            <a:ext cx="3810000" cy="3810000"/>
+          </a:xfrm>
+          <a:prstGeom prst="rect">
+            <a:avLst/>
+          </a:prstGeom>
+        </p:spPr>
+      </p:pic>
+    </p:spTree>
+  </p:cSld>
+  <p:clrMapOvr>
+    <a:masterClrMapping/>
+  </p:clrMapOvr>
+</p:sld>
+</file>
+
+<file path=ppt/slides/slide11.xml><?xml version="1.0" encoding="utf-8"?>
+<p:sld xmlns:a="http://schemas.openxmlformats.org/drawingml/2006/main" xmlns:r="http://schemas.openxmlformats.org/officeDocument/2006/relationships" xmlns:mc="http://schemas.openxmlformats.org/markup-compatibility/2006" xmlns:mv="urn:schemas-microsoft-com:mac:vml" xmlns:p="http://schemas.openxmlformats.org/presentationml/2006/main" mc:Ignorable="mv" mc:PreserveAttributes="mv:*">
+  <p:cSld>
+    <p:spTree>
+      <p:nvGrpSpPr>
+        <p:cNvPr id="1" name=""/>
+        <p:cNvGrpSpPr/>
+        <p:nvPr/>
+      </p:nvGrpSpPr>
+      <p:grpSpPr>
+        <a:xfrm>
+          <a:off x="0" y="0"/>
+          <a:ext cx="0" cy="0"/>
+          <a:chOff x="0" y="0"/>
+          <a:chExt cx="0" cy="0"/>
+        </a:xfrm>
+      </p:grpSpPr>
       <p:pic>
         <p:nvPicPr>
           <p:cNvPr id="4" name="Picture 3"/>
@@ -3929,11 +4046,7 @@
             </a:r>
             <a:r>
               <a:rPr lang="en-US" dirty="0" smtClean="0"/>
-              <a:t>, etc</a:t>
-            </a:r>
-            <a:r>
-              <a:rPr lang="en-US" dirty="0" smtClean="0"/>
-              <a:t>.</a:t>
+              <a:t>, etc.</a:t>
             </a:r>
           </a:p>
           <a:p>
@@ -4108,15 +4221,7 @@
           <a:p>
             <a:r>
               <a:rPr lang="en-US" dirty="0" smtClean="0"/>
-              <a:t>Your data are linked to</a:t>
-            </a:r>
-            <a:r>
-              <a:rPr lang="en-US" dirty="0" smtClean="0"/>
-              <a:t> things </a:t>
-            </a:r>
-            <a:r>
-              <a:rPr lang="en-US" dirty="0" smtClean="0"/>
-              <a:t>in the real world</a:t>
+              <a:t>Your data are linked to things in the real world</a:t>
             </a:r>
           </a:p>
           <a:p>
@@ -4151,11 +4256,7 @@
             <a:pPr lvl="1"/>
             <a:r>
               <a:rPr lang="en-US" dirty="0" smtClean="0"/>
-              <a:t>Links to trees and studies (TreeBASE</a:t>
-            </a:r>
-            <a:r>
-              <a:rPr lang="en-US" dirty="0" smtClean="0"/>
-              <a:t>)</a:t>
+              <a:t>Links to trees and studies (TreeBASE)</a:t>
             </a:r>
           </a:p>
         </p:txBody>
@@ -4209,7 +4310,7 @@
           <a:p>
             <a:r>
               <a:rPr lang="en-US" dirty="0" smtClean="0"/>
-              <a:t>Versioning</a:t>
+              <a:t>Sharing and re-using</a:t>
             </a:r>
             <a:endParaRPr lang="en-US" dirty="0"/>
           </a:p>
@@ -4232,34 +4333,47 @@
           <a:p>
             <a:r>
               <a:rPr lang="en-US" dirty="0" smtClean="0"/>
-              <a:t>Your research will progress, you will change/add/delete things</a:t>
-            </a:r>
-          </a:p>
-          <a:p>
-            <a:r>
-              <a:rPr lang="en-US" dirty="0" smtClean="0"/>
-              <a:t>Pick the right tools to track this for you:</a:t>
+              <a:t>“Stand on the shoulders of giants”</a:t>
+            </a:r>
+          </a:p>
+          <a:p>
+            <a:r>
+              <a:rPr lang="en-US" dirty="0" smtClean="0"/>
+              <a:t>In a “Big Science”, we can’t do all on our own</a:t>
+            </a:r>
+          </a:p>
+          <a:p>
+            <a:r>
+              <a:rPr lang="en-US" dirty="0" smtClean="0"/>
+              <a:t>Identify ways to share and re-use data:</a:t>
             </a:r>
           </a:p>
           <a:p>
             <a:pPr lvl="1"/>
             <a:r>
               <a:rPr lang="en-US" dirty="0" smtClean="0"/>
-              <a:t>Need to remember what you did</a:t>
+              <a:t>TreeBASE</a:t>
             </a:r>
           </a:p>
           <a:p>
             <a:pPr lvl="1"/>
             <a:r>
               <a:rPr lang="en-US" dirty="0" smtClean="0"/>
-              <a:t>Need to justify to others (collaborators, reviewers)</a:t>
+              <a:t>Dryad</a:t>
             </a:r>
           </a:p>
           <a:p>
             <a:pPr lvl="1"/>
             <a:r>
               <a:rPr lang="en-US" dirty="0" smtClean="0"/>
-              <a:t>May need to go “back in time”</a:t>
+              <a:t>Etc.</a:t>
+            </a:r>
+          </a:p>
+          <a:p>
+            <a:pPr lvl="1"/>
+            <a:r>
+              <a:rPr lang="en-US" dirty="0" smtClean="0"/>
+              <a:t>(Also version control systems!)</a:t>
             </a:r>
             <a:endParaRPr lang="en-US" dirty="0"/>
           </a:p>
@@ -4314,7 +4428,7 @@
           <a:p>
             <a:r>
               <a:rPr lang="en-US" dirty="0" smtClean="0"/>
-              <a:t>Sharing and re-using</a:t>
+              <a:t>Standardizing</a:t>
             </a:r>
             <a:endParaRPr lang="en-US" dirty="0"/>
           </a:p>
@@ -4337,55 +4451,20 @@
           <a:p>
             <a:r>
               <a:rPr lang="en-US" dirty="0" smtClean="0"/>
-              <a:t>“Stand on the shoulders of giants”</a:t>
-            </a:r>
-          </a:p>
-          <a:p>
-            <a:r>
-              <a:rPr lang="en-US" dirty="0" smtClean="0"/>
-              <a:t>In a “Big Science”, we can’t do</a:t>
-            </a:r>
-            <a:r>
-              <a:rPr lang="en-US" dirty="0" smtClean="0"/>
-              <a:t> all on </a:t>
-            </a:r>
-            <a:r>
-              <a:rPr lang="en-US" dirty="0" smtClean="0"/>
-              <a:t>our own</a:t>
-            </a:r>
-          </a:p>
-          <a:p>
-            <a:r>
-              <a:rPr lang="en-US" dirty="0" smtClean="0"/>
-              <a:t>Identify ways to share and re-use data:</a:t>
+              <a:t>Data standards enable sharing, re-using, and integrating</a:t>
+            </a:r>
+          </a:p>
+          <a:p>
+            <a:r>
+              <a:rPr lang="en-US" dirty="0" smtClean="0"/>
+              <a:t>Understand the standards that you work with, and follow them:</a:t>
             </a:r>
           </a:p>
           <a:p>
             <a:pPr lvl="1"/>
             <a:r>
               <a:rPr lang="en-US" dirty="0" smtClean="0"/>
-              <a:t>TreeBASE</a:t>
-            </a:r>
-          </a:p>
-          <a:p>
-            <a:pPr lvl="1"/>
-            <a:r>
-              <a:rPr lang="en-US" dirty="0" smtClean="0"/>
-              <a:t>Dryad</a:t>
-            </a:r>
-          </a:p>
-          <a:p>
-            <a:pPr lvl="1"/>
-            <a:r>
-              <a:rPr lang="en-US" dirty="0" smtClean="0"/>
-              <a:t>Etc.</a:t>
-            </a:r>
-          </a:p>
-          <a:p>
-            <a:pPr lvl="1"/>
-            <a:r>
-              <a:rPr lang="en-US" dirty="0" smtClean="0"/>
-              <a:t>(Also version control systems!)</a:t>
+              <a:t>NeXML, phyloXML, NEXUS, NEWICK, FASTA, etc.</a:t>
             </a:r>
             <a:endParaRPr lang="en-US" dirty="0"/>
           </a:p>
@@ -4396,13 +4475,6 @@
   <p:clrMapOvr>
     <a:masterClrMapping/>
   </p:clrMapOvr>
-  <p:timing>
-    <p:tnLst>
-      <p:par>
-        <p:cTn id="1" dur="indefinite" restart="never" nodeType="tmRoot"/>
-      </p:par>
-    </p:tnLst>
-  </p:timing>
 </p:sld>
 </file>
 
@@ -4440,7 +4512,7 @@
           <a:p>
             <a:r>
               <a:rPr lang="en-US" dirty="0" smtClean="0"/>
-              <a:t>Phyloinformatics</a:t>
+              <a:t>Versioning</a:t>
             </a:r>
             <a:endParaRPr lang="en-US" dirty="0"/>
           </a:p>
@@ -4461,12 +4533,36 @@
           <a:bodyPr/>
           <a:lstStyle/>
           <a:p>
-            <a:pPr indent="0" algn="ctr">
-              <a:buNone/>
-            </a:pPr>
-            <a:r>
-              <a:rPr lang="en-US" dirty="0" smtClean="0"/>
-              <a:t>Phyloinformatics applies the principles of scaling up, integrating, sharing and re-using to the problem of phylogeny</a:t>
+            <a:r>
+              <a:rPr lang="en-US" dirty="0" smtClean="0"/>
+              <a:t>Your research will progress, you will change/add/delete things</a:t>
+            </a:r>
+          </a:p>
+          <a:p>
+            <a:r>
+              <a:rPr lang="en-US" dirty="0" smtClean="0"/>
+              <a:t>Pick the right tools to track this for you:</a:t>
+            </a:r>
+          </a:p>
+          <a:p>
+            <a:pPr lvl="1"/>
+            <a:r>
+              <a:rPr lang="en-US" dirty="0" smtClean="0"/>
+              <a:t>Need to remember what you did</a:t>
+            </a:r>
+          </a:p>
+          <a:p>
+            <a:pPr lvl="1"/>
+            <a:r>
+              <a:rPr lang="en-US" dirty="0" smtClean="0"/>
+              <a:t>Need to justify to others (collaborators, reviewers)</a:t>
+            </a:r>
+          </a:p>
+          <a:p>
+            <a:pPr lvl="1"/>
+            <a:r>
+              <a:rPr lang="en-US" dirty="0" smtClean="0"/>
+              <a:t>May need to go “back in time”</a:t>
             </a:r>
             <a:endParaRPr lang="en-US" dirty="0"/>
           </a:p>
@@ -4521,7 +4617,7 @@
           <a:p>
             <a:r>
               <a:rPr lang="en-US" dirty="0" smtClean="0"/>
-              <a:t>Example</a:t>
+              <a:t>Phyloinformatics</a:t>
             </a:r>
             <a:endParaRPr lang="en-US" dirty="0"/>
           </a:p>
@@ -4529,98 +4625,30 @@
       </p:sp>
       <p:sp>
         <p:nvSpPr>
-          <p:cNvPr id="6" name="TextBox 5"/>
-          <p:cNvSpPr txBox="1"/>
-          <p:nvPr/>
-        </p:nvSpPr>
-        <p:spPr>
-          <a:xfrm>
-            <a:off x="5410200" y="3940076"/>
-            <a:ext cx="2895600" cy="2308324"/>
-          </a:xfrm>
-          <a:prstGeom prst="rect">
-            <a:avLst/>
-          </a:prstGeom>
-          <a:noFill/>
-        </p:spPr>
-        <p:txBody>
-          <a:bodyPr wrap="square" rtlCol="0">
-            <a:spAutoFit/>
-          </a:bodyPr>
-          <a:lstStyle/>
-          <a:p>
-            <a:r>
-              <a:rPr lang="en-US" dirty="0" smtClean="0"/>
-              <a:t>O. R. P. </a:t>
-            </a:r>
-            <a:r>
-              <a:rPr lang="en-US" dirty="0" err="1" smtClean="0"/>
-              <a:t>Bininda-Emonds</a:t>
-            </a:r>
-            <a:r>
-              <a:rPr lang="en-US" dirty="0" smtClean="0"/>
-              <a:t>, M. </a:t>
-            </a:r>
-            <a:r>
-              <a:rPr lang="en-US" dirty="0" err="1" smtClean="0"/>
-              <a:t>Cardillo</a:t>
-            </a:r>
-            <a:r>
-              <a:rPr lang="en-US" dirty="0" smtClean="0"/>
-              <a:t>, K. E. Jones, R. D. E. </a:t>
-            </a:r>
-            <a:r>
-              <a:rPr lang="en-US" dirty="0" err="1" smtClean="0"/>
-              <a:t>MacPhee</a:t>
-            </a:r>
-            <a:r>
-              <a:rPr lang="en-US" dirty="0" smtClean="0"/>
-              <a:t>, R. M. D. Beck, R. </a:t>
-            </a:r>
-            <a:r>
-              <a:rPr lang="en-US" dirty="0" err="1" smtClean="0"/>
-              <a:t>Grenyer</a:t>
-            </a:r>
-            <a:r>
-              <a:rPr lang="en-US" dirty="0" smtClean="0"/>
-              <a:t>, S. A. Price, R. A. Vos, J. L. </a:t>
-            </a:r>
-            <a:r>
-              <a:rPr lang="en-US" dirty="0" err="1" smtClean="0"/>
-              <a:t>Gittleman</a:t>
-            </a:r>
-            <a:r>
-              <a:rPr lang="en-US" dirty="0" smtClean="0"/>
-              <a:t> and A. Purvis, 2007. The delayed rise of present-day mammals. Nature 446: 507-512.</a:t>
+          <p:cNvPr id="3" name="Content Placeholder 2"/>
+          <p:cNvSpPr>
+            <a:spLocks noGrp="1"/>
+          </p:cNvSpPr>
+          <p:nvPr>
+            <p:ph sz="quarter" idx="1"/>
+          </p:nvPr>
+        </p:nvSpPr>
+        <p:spPr/>
+        <p:txBody>
+          <a:bodyPr/>
+          <a:lstStyle/>
+          <a:p>
+            <a:pPr indent="0" algn="ctr">
+              <a:buNone/>
+            </a:pPr>
+            <a:r>
+              <a:rPr lang="en-US" dirty="0" smtClean="0"/>
+              <a:t>Phyloinformatics applies the principles of scaling up, integrating, sharing and re-using to the problem of phylogeny</a:t>
             </a:r>
             <a:endParaRPr lang="en-US" dirty="0"/>
           </a:p>
         </p:txBody>
       </p:sp>
-      <p:pic>
-        <p:nvPicPr>
-          <p:cNvPr id="7" name="Picture 6"/>
-          <p:cNvPicPr>
-            <a:picLocks noChangeAspect="1"/>
-          </p:cNvPicPr>
-          <p:nvPr/>
-        </p:nvPicPr>
-        <p:blipFill>
-          <a:blip r:embed="rId2"/>
-          <a:stretch>
-            <a:fillRect/>
-          </a:stretch>
-        </p:blipFill>
-        <p:spPr>
-          <a:xfrm>
-            <a:off x="863600" y="1951609"/>
-            <a:ext cx="4241800" cy="4220591"/>
-          </a:xfrm>
-          <a:prstGeom prst="rect">
-            <a:avLst/>
-          </a:prstGeom>
-        </p:spPr>
-      </p:pic>
     </p:spTree>
   </p:cSld>
   <p:clrMapOvr>
@@ -4670,7 +4698,7 @@
           <a:p>
             <a:r>
               <a:rPr lang="en-US" dirty="0" smtClean="0"/>
-              <a:t>What’s next?</a:t>
+              <a:t>Example</a:t>
             </a:r>
             <a:endParaRPr lang="en-US" dirty="0"/>
           </a:p>
@@ -4678,50 +4706,69 @@
       </p:sp>
       <p:sp>
         <p:nvSpPr>
-          <p:cNvPr id="4" name="Content Placeholder 3"/>
-          <p:cNvSpPr>
-            <a:spLocks noGrp="1"/>
-          </p:cNvSpPr>
-          <p:nvPr>
-            <p:ph sz="quarter" idx="1"/>
-          </p:nvPr>
-        </p:nvSpPr>
-        <p:spPr/>
-        <p:txBody>
-          <a:bodyPr/>
-          <a:lstStyle/>
-          <a:p>
-            <a:r>
-              <a:rPr lang="en-US" dirty="0" smtClean="0"/>
-              <a:t>By applying the principles of phyloinformatics we can do things like:</a:t>
-            </a:r>
-          </a:p>
-          <a:p>
-            <a:pPr lvl="1"/>
-            <a:r>
-              <a:rPr lang="en-US" dirty="0" smtClean="0"/>
-              <a:t>Get the tree for a set of names (even with misspellings, synonyms)</a:t>
-            </a:r>
-          </a:p>
-          <a:p>
-            <a:pPr lvl="1"/>
-            <a:r>
-              <a:rPr lang="en-US" dirty="0" smtClean="0"/>
-              <a:t>Use it for gene tree/species tree reconciliation</a:t>
-            </a:r>
-          </a:p>
-          <a:p>
-            <a:pPr lvl="1"/>
-            <a:r>
-              <a:rPr lang="en-US" dirty="0" smtClean="0"/>
-              <a:t>Comparative analysis</a:t>
-            </a:r>
-          </a:p>
-          <a:p>
-            <a:pPr lvl="1"/>
-            <a:r>
-              <a:rPr lang="en-US" dirty="0" smtClean="0"/>
-              <a:t>Etc.</a:t>
+          <p:cNvPr id="6" name="TextBox 5"/>
+          <p:cNvSpPr txBox="1"/>
+          <p:nvPr/>
+        </p:nvSpPr>
+        <p:spPr>
+          <a:xfrm>
+            <a:off x="5410200" y="3940076"/>
+            <a:ext cx="2895600" cy="2308324"/>
+          </a:xfrm>
+          <a:prstGeom prst="rect">
+            <a:avLst/>
+          </a:prstGeom>
+          <a:noFill/>
+        </p:spPr>
+        <p:txBody>
+          <a:bodyPr wrap="square" rtlCol="0">
+            <a:spAutoFit/>
+          </a:bodyPr>
+          <a:lstStyle/>
+          <a:p>
+            <a:r>
+              <a:rPr lang="en-US" dirty="0" smtClean="0"/>
+              <a:t>O. R. P. </a:t>
+            </a:r>
+            <a:r>
+              <a:rPr lang="en-US" dirty="0" err="1" smtClean="0"/>
+              <a:t>Bininda-Emonds</a:t>
+            </a:r>
+            <a:r>
+              <a:rPr lang="en-US" dirty="0" smtClean="0"/>
+              <a:t>, M. </a:t>
+            </a:r>
+            <a:r>
+              <a:rPr lang="en-US" dirty="0" err="1" smtClean="0"/>
+              <a:t>Cardillo</a:t>
+            </a:r>
+            <a:r>
+              <a:rPr lang="en-US" dirty="0" smtClean="0"/>
+              <a:t>, K. E. Jones, R. D. E. </a:t>
+            </a:r>
+            <a:r>
+              <a:rPr lang="en-US" dirty="0" err="1" smtClean="0"/>
+              <a:t>MacPhee</a:t>
+            </a:r>
+            <a:r>
+              <a:rPr lang="en-US" dirty="0" smtClean="0"/>
+              <a:t>, R. M. D. Beck, R. </a:t>
+            </a:r>
+            <a:r>
+              <a:rPr lang="en-US" dirty="0" err="1" smtClean="0"/>
+              <a:t>Grenyer</a:t>
+            </a:r>
+            <a:r>
+              <a:rPr lang="en-US" dirty="0" smtClean="0"/>
+              <a:t>, S. A. Price, R. A. Vos, J. L. </a:t>
+            </a:r>
+            <a:r>
+              <a:rPr lang="en-US" dirty="0" err="1" smtClean="0"/>
+              <a:t>Gittleman</a:t>
+            </a:r>
+            <a:r>
+              <a:rPr lang="en-US" dirty="0" smtClean="0"/>
+              <a:t> and A. Purvis, 2007. The delayed rise of present-day mammals. Nature 446: 507-512.</a:t>
             </a:r>
             <a:endParaRPr lang="en-US" dirty="0"/>
           </a:p>
@@ -4729,7 +4776,7 @@
       </p:sp>
       <p:pic>
         <p:nvPicPr>
-          <p:cNvPr id="3" name="Picture 2"/>
+          <p:cNvPr id="7" name="Picture 6"/>
           <p:cNvPicPr>
             <a:picLocks noChangeAspect="1"/>
           </p:cNvPicPr>
@@ -4743,8 +4790,8 @@
         </p:blipFill>
         <p:spPr>
           <a:xfrm>
-            <a:off x="2514600" y="4800601"/>
-            <a:ext cx="6069541" cy="1589116"/>
+            <a:off x="863600" y="1951609"/>
+            <a:ext cx="4241800" cy="4220591"/>
           </a:xfrm>
           <a:prstGeom prst="rect">
             <a:avLst/>
@@ -4756,6 +4803,13 @@
   <p:clrMapOvr>
     <a:masterClrMapping/>
   </p:clrMapOvr>
+  <p:timing>
+    <p:tnLst>
+      <p:par>
+        <p:cTn id="1" dur="indefinite" restart="never" nodeType="tmRoot"/>
+      </p:par>
+    </p:tnLst>
+  </p:timing>
 </p:sld>
 </file>
 
@@ -4793,7 +4847,7 @@
           <a:p>
             <a:r>
               <a:rPr lang="en-US" dirty="0" smtClean="0"/>
-              <a:t>Get involved!</a:t>
+              <a:t>What’s next?</a:t>
             </a:r>
             <a:endParaRPr lang="en-US" dirty="0"/>
           </a:p>
@@ -4801,7 +4855,7 @@
       </p:sp>
       <p:sp>
         <p:nvSpPr>
-          <p:cNvPr id="3" name="Content Placeholder 2"/>
+          <p:cNvPr id="4" name="Content Placeholder 3"/>
           <p:cNvSpPr>
             <a:spLocks noGrp="1"/>
           </p:cNvSpPr>
@@ -4816,28 +4870,35 @@
           <a:p>
             <a:r>
               <a:rPr lang="en-US" dirty="0" smtClean="0"/>
-              <a:t>Participate in the phyloinformatics community:</a:t>
+              <a:t>By applying the principles of phyloinformatics we can do things like:</a:t>
             </a:r>
           </a:p>
           <a:p>
             <a:pPr lvl="1"/>
             <a:r>
               <a:rPr lang="en-US" dirty="0" smtClean="0"/>
-              <a:t>Share data </a:t>
+              <a:t>Get the tree for a set of names (even with misspellings, synonyms)</a:t>
             </a:r>
           </a:p>
           <a:p>
             <a:pPr lvl="1"/>
             <a:r>
               <a:rPr lang="en-US" dirty="0" smtClean="0"/>
-              <a:t>Share open source code</a:t>
+              <a:t>Use it for gene tree/species tree reconciliation</a:t>
             </a:r>
           </a:p>
           <a:p>
             <a:pPr lvl="1"/>
             <a:r>
               <a:rPr lang="en-US" dirty="0" smtClean="0"/>
-              <a:t>Collaborate</a:t>
+              <a:t>Comparative analysis</a:t>
+            </a:r>
+          </a:p>
+          <a:p>
+            <a:pPr lvl="1"/>
+            <a:r>
+              <a:rPr lang="en-US" dirty="0" smtClean="0"/>
+              <a:t>Etc.</a:t>
             </a:r>
             <a:endParaRPr lang="en-US" dirty="0"/>
           </a:p>
@@ -4845,7 +4906,7 @@
       </p:sp>
       <p:pic>
         <p:nvPicPr>
-          <p:cNvPr id="4" name="Picture 3" descr="gsoc.jpg"/>
+          <p:cNvPr id="3" name="Picture 2"/>
           <p:cNvPicPr>
             <a:picLocks noChangeAspect="1"/>
           </p:cNvPicPr>
@@ -4859,8 +4920,8 @@
         </p:blipFill>
         <p:spPr>
           <a:xfrm>
-            <a:off x="4876800" y="2590800"/>
-            <a:ext cx="3810000" cy="3810000"/>
+            <a:off x="2514600" y="4800601"/>
+            <a:ext cx="6069541" cy="1589116"/>
           </a:xfrm>
           <a:prstGeom prst="rect">
             <a:avLst/>

</xml_diff>